<commit_message>
Actualizacion con nueva foto y video curriculum entre otras coas
</commit_message>
<xml_diff>
--- a/pdf/DanielLopezLozano.pptx
+++ b/pdf/DanielLopezLozano.pptx
@@ -104,6 +104,22 @@
       </a:defRPr>
     </a:lvl9pPr>
   </p:defaultTextStyle>
+  <p:extLst>
+    <p:ext uri="{EFAFB233-063F-42B5-8137-9DF3F51BA10A}">
+      <p15:sldGuideLst xmlns:p15="http://schemas.microsoft.com/office/powerpoint/2012/main">
+        <p15:guide id="1" orient="horz" pos="2880">
+          <p15:clr>
+            <a:srgbClr val="A4A3A4"/>
+          </p15:clr>
+        </p15:guide>
+        <p15:guide id="2" pos="2160">
+          <p15:clr>
+            <a:srgbClr val="A4A3A4"/>
+          </p15:clr>
+        </p15:guide>
+      </p15:sldGuideLst>
+    </p:ext>
+  </p:extLst>
 </p:presentation>
 </file>
 
@@ -246,7 +262,7 @@
           <a:p>
             <a:fld id="{1D8BD707-D9CF-40AE-B4C6-C98DA3205C09}" type="datetimeFigureOut">
               <a:rPr lang="en-US"/>
-              <a:t>4/18/2023</a:t>
+              <a:t>6/18/2023</a:t>
             </a:fld>
             <a:endParaRPr lang="en-US"/>
           </a:p>
@@ -417,7 +433,7 @@
           <a:p>
             <a:fld id="{1D8BD707-D9CF-40AE-B4C6-C98DA3205C09}" type="datetimeFigureOut">
               <a:rPr lang="en-US"/>
-              <a:t>4/18/2023</a:t>
+              <a:t>6/18/2023</a:t>
             </a:fld>
             <a:endParaRPr lang="en-US"/>
           </a:p>
@@ -631,7 +647,7 @@
           <a:p>
             <a:fld id="{1D8BD707-D9CF-40AE-B4C6-C98DA3205C09}" type="datetimeFigureOut">
               <a:rPr lang="en-US"/>
-              <a:t>4/18/2023</a:t>
+              <a:t>6/18/2023</a:t>
             </a:fld>
             <a:endParaRPr lang="en-US"/>
           </a:p>
@@ -779,7 +795,7 @@
           <a:p>
             <a:fld id="{1D8BD707-D9CF-40AE-B4C6-C98DA3205C09}" type="datetimeFigureOut">
               <a:rPr lang="en-US"/>
-              <a:t>4/18/2023</a:t>
+              <a:t>6/18/2023</a:t>
             </a:fld>
             <a:endParaRPr lang="en-US"/>
           </a:p>
@@ -898,7 +914,7 @@
           <a:p>
             <a:fld id="{1D8BD707-D9CF-40AE-B4C6-C98DA3205C09}" type="datetimeFigureOut">
               <a:rPr lang="en-US"/>
-              <a:t>4/18/2023</a:t>
+              <a:t>6/18/2023</a:t>
             </a:fld>
             <a:endParaRPr lang="en-US"/>
           </a:p>
@@ -1283,7 +1299,7 @@
           <a:p>
             <a:fld id="{1D8BD707-D9CF-40AE-B4C6-C98DA3205C09}" type="datetimeFigureOut">
               <a:rPr lang="en-US"/>
-              <a:t>4/18/2023</a:t>
+              <a:t>6/18/2023</a:t>
             </a:fld>
             <a:endParaRPr lang="en-US"/>
           </a:p>
@@ -2129,7 +2145,7 @@
         <p:spPr>
           <a:xfrm>
             <a:off x="3068291" y="6492875"/>
-            <a:ext cx="4129404" cy="2347595"/>
+            <a:ext cx="4129404" cy="2224455"/>
           </a:xfrm>
           <a:prstGeom prst="rect">
             <a:avLst/>
@@ -2708,17 +2724,27 @@
               <a:t> </a:t>
             </a:r>
             <a:r>
-              <a:rPr sz="1050" spc="45" dirty="0">
-                <a:solidFill>
-                  <a:srgbClr val="444440"/>
-                </a:solidFill>
-                <a:latin typeface="Tahoma"/>
-                <a:cs typeface="Tahoma"/>
-              </a:rPr>
-              <a:t>JavaScript,</a:t>
-            </a:r>
-            <a:r>
-              <a:rPr sz="1050" spc="-5" dirty="0">
+              <a:rPr sz="1050" spc="45" dirty="0" smtClean="0">
+                <a:solidFill>
+                  <a:srgbClr val="444440"/>
+                </a:solidFill>
+                <a:latin typeface="Tahoma"/>
+                <a:cs typeface="Tahoma"/>
+              </a:rPr>
+              <a:t>JavaScript</a:t>
+            </a:r>
+            <a:r>
+              <a:rPr lang="es-ES" sz="1050" spc="45" dirty="0" smtClean="0">
+                <a:solidFill>
+                  <a:srgbClr val="444440"/>
+                </a:solidFill>
+                <a:latin typeface="Tahoma"/>
+                <a:cs typeface="Tahoma"/>
+              </a:rPr>
+              <a:t> y</a:t>
+            </a:r>
+            <a:r>
+              <a:rPr sz="1050" spc="-5" dirty="0" smtClean="0">
                 <a:solidFill>
                   <a:srgbClr val="444440"/>
                 </a:solidFill>
@@ -3342,260 +3368,267 @@
           </a:p>
           <a:p>
             <a:pPr marL="12700">
-              <a:lnSpc>
-                <a:spcPct val="100000"/>
-              </a:lnSpc>
               <a:spcBef>
-                <a:spcPts val="969"/>
+                <a:spcPts val="140"/>
               </a:spcBef>
             </a:pPr>
             <a:r>
-              <a:rPr sz="1200" b="1" spc="-30" dirty="0">
-                <a:solidFill>
-                  <a:srgbClr val="444440"/>
-                </a:solidFill>
-                <a:latin typeface="Trebuchet MS"/>
-                <a:cs typeface="Trebuchet MS"/>
-              </a:rPr>
-              <a:t>E.T.S.</a:t>
-            </a:r>
-            <a:r>
-              <a:rPr sz="1200" b="1" spc="-10" dirty="0">
-                <a:solidFill>
-                  <a:srgbClr val="444440"/>
-                </a:solidFill>
-                <a:latin typeface="Trebuchet MS"/>
-                <a:cs typeface="Trebuchet MS"/>
-              </a:rPr>
-              <a:t> </a:t>
-            </a:r>
-            <a:r>
-              <a:rPr sz="1200" b="1" spc="5" dirty="0">
-                <a:solidFill>
-                  <a:srgbClr val="444440"/>
-                </a:solidFill>
-                <a:latin typeface="Trebuchet MS"/>
-                <a:cs typeface="Trebuchet MS"/>
-              </a:rPr>
-              <a:t>Ingeniería</a:t>
-            </a:r>
-            <a:r>
-              <a:rPr sz="1200" b="1" spc="-10" dirty="0">
-                <a:solidFill>
-                  <a:srgbClr val="444440"/>
-                </a:solidFill>
-                <a:latin typeface="Trebuchet MS"/>
-                <a:cs typeface="Trebuchet MS"/>
-              </a:rPr>
-              <a:t> </a:t>
-            </a:r>
-            <a:r>
-              <a:rPr sz="1200" b="1" spc="10" dirty="0">
-                <a:solidFill>
-                  <a:srgbClr val="444440"/>
-                </a:solidFill>
-                <a:latin typeface="Trebuchet MS"/>
-                <a:cs typeface="Trebuchet MS"/>
-              </a:rPr>
-              <a:t>Informática</a:t>
-            </a:r>
-            <a:r>
-              <a:rPr sz="1200" b="1" spc="-10" dirty="0">
-                <a:solidFill>
-                  <a:srgbClr val="444440"/>
-                </a:solidFill>
-                <a:latin typeface="Trebuchet MS"/>
-                <a:cs typeface="Trebuchet MS"/>
-              </a:rPr>
-              <a:t> </a:t>
-            </a:r>
-            <a:r>
-              <a:rPr sz="1200" b="1" spc="-30" dirty="0">
-                <a:solidFill>
-                  <a:srgbClr val="444440"/>
-                </a:solidFill>
-                <a:latin typeface="Trebuchet MS"/>
-                <a:cs typeface="Trebuchet MS"/>
-              </a:rPr>
-              <a:t>de</a:t>
-            </a:r>
-            <a:r>
-              <a:rPr sz="1200" b="1" spc="-10" dirty="0">
-                <a:solidFill>
-                  <a:srgbClr val="444440"/>
-                </a:solidFill>
-                <a:latin typeface="Trebuchet MS"/>
-                <a:cs typeface="Trebuchet MS"/>
-              </a:rPr>
-              <a:t> </a:t>
-            </a:r>
-            <a:r>
-              <a:rPr sz="1200" b="1" spc="-5" dirty="0">
-                <a:solidFill>
-                  <a:srgbClr val="444440"/>
-                </a:solidFill>
-                <a:latin typeface="Trebuchet MS"/>
-                <a:cs typeface="Trebuchet MS"/>
-              </a:rPr>
-              <a:t>la</a:t>
-            </a:r>
-            <a:r>
-              <a:rPr sz="1200" b="1" spc="-10" dirty="0">
-                <a:solidFill>
-                  <a:srgbClr val="444440"/>
-                </a:solidFill>
-                <a:latin typeface="Trebuchet MS"/>
-                <a:cs typeface="Trebuchet MS"/>
-              </a:rPr>
-              <a:t> </a:t>
-            </a:r>
-            <a:r>
-              <a:rPr sz="1200" b="1" spc="10" dirty="0">
-                <a:solidFill>
-                  <a:srgbClr val="444440"/>
-                </a:solidFill>
-                <a:latin typeface="Trebuchet MS"/>
-                <a:cs typeface="Trebuchet MS"/>
-              </a:rPr>
-              <a:t>Universidad</a:t>
-            </a:r>
-            <a:r>
-              <a:rPr sz="1200" b="1" spc="-5" dirty="0">
-                <a:solidFill>
-                  <a:srgbClr val="444440"/>
-                </a:solidFill>
-                <a:latin typeface="Trebuchet MS"/>
-                <a:cs typeface="Trebuchet MS"/>
-              </a:rPr>
-              <a:t> </a:t>
-            </a:r>
-            <a:r>
-              <a:rPr sz="1200" b="1" spc="-30" dirty="0">
-                <a:solidFill>
-                  <a:srgbClr val="444440"/>
-                </a:solidFill>
-                <a:latin typeface="Trebuchet MS"/>
-                <a:cs typeface="Trebuchet MS"/>
-              </a:rPr>
-              <a:t>de</a:t>
-            </a:r>
-            <a:r>
-              <a:rPr sz="1200" b="1" spc="-10" dirty="0">
-                <a:solidFill>
-                  <a:srgbClr val="444440"/>
-                </a:solidFill>
-                <a:latin typeface="Trebuchet MS"/>
-                <a:cs typeface="Trebuchet MS"/>
-              </a:rPr>
-              <a:t> </a:t>
-            </a:r>
-            <a:r>
-              <a:rPr sz="1200" b="1" spc="30" dirty="0">
-                <a:solidFill>
-                  <a:srgbClr val="444440"/>
-                </a:solidFill>
-                <a:latin typeface="Trebuchet MS"/>
-                <a:cs typeface="Trebuchet MS"/>
-              </a:rPr>
-              <a:t>Málaga</a:t>
-            </a:r>
-            <a:endParaRPr sz="1200" dirty="0">
-              <a:latin typeface="Trebuchet MS"/>
-              <a:cs typeface="Trebuchet MS"/>
+              <a:rPr sz="1100" b="1" spc="-10" dirty="0" smtClean="0">
+                <a:solidFill>
+                  <a:srgbClr val="444440"/>
+                </a:solidFill>
+                <a:latin typeface="Tahoma"/>
+                <a:cs typeface="Tahoma"/>
+              </a:rPr>
+              <a:t>Ingeniería </a:t>
+            </a:r>
+            <a:r>
+              <a:rPr sz="1100" b="1" spc="-20" dirty="0" smtClean="0">
+                <a:solidFill>
+                  <a:srgbClr val="444440"/>
+                </a:solidFill>
+                <a:latin typeface="Tahoma"/>
+                <a:cs typeface="Tahoma"/>
+              </a:rPr>
+              <a:t>en</a:t>
+            </a:r>
+            <a:r>
+              <a:rPr sz="1100" b="1" spc="-10" dirty="0" smtClean="0">
+                <a:solidFill>
+                  <a:srgbClr val="444440"/>
+                </a:solidFill>
+                <a:latin typeface="Tahoma"/>
+                <a:cs typeface="Tahoma"/>
+              </a:rPr>
+              <a:t> </a:t>
+            </a:r>
+            <a:r>
+              <a:rPr sz="1100" b="1" spc="-5" dirty="0" smtClean="0">
+                <a:solidFill>
+                  <a:srgbClr val="444440"/>
+                </a:solidFill>
+                <a:latin typeface="Tahoma"/>
+                <a:cs typeface="Tahoma"/>
+              </a:rPr>
+              <a:t>Informática (plan</a:t>
+            </a:r>
+            <a:r>
+              <a:rPr sz="1100" b="1" spc="-10" dirty="0" smtClean="0">
+                <a:solidFill>
+                  <a:srgbClr val="444440"/>
+                </a:solidFill>
+                <a:latin typeface="Tahoma"/>
+                <a:cs typeface="Tahoma"/>
+              </a:rPr>
+              <a:t> </a:t>
+            </a:r>
+            <a:r>
+              <a:rPr sz="1100" b="1" spc="5" dirty="0" smtClean="0">
+                <a:solidFill>
+                  <a:srgbClr val="444440"/>
+                </a:solidFill>
+                <a:latin typeface="Tahoma"/>
+                <a:cs typeface="Tahoma"/>
+              </a:rPr>
+              <a:t>pre-Bolonia)</a:t>
+            </a:r>
+            <a:r>
+              <a:rPr sz="1100" b="1" spc="-5" dirty="0" smtClean="0">
+                <a:solidFill>
+                  <a:srgbClr val="444440"/>
+                </a:solidFill>
+                <a:latin typeface="Tahoma"/>
+                <a:cs typeface="Tahoma"/>
+              </a:rPr>
+              <a:t> </a:t>
+            </a:r>
+            <a:r>
+              <a:rPr sz="1100" b="1" spc="-40" dirty="0" smtClean="0">
+                <a:solidFill>
+                  <a:srgbClr val="444440"/>
+                </a:solidFill>
+                <a:latin typeface="Tahoma"/>
+                <a:cs typeface="Tahoma"/>
+              </a:rPr>
+              <a:t>2000-2005</a:t>
+            </a:r>
+            <a:endParaRPr lang="es-ES" sz="1100" b="1" spc="-40" dirty="0" smtClean="0">
+              <a:solidFill>
+                <a:srgbClr val="444440"/>
+              </a:solidFill>
+              <a:latin typeface="Tahoma"/>
+              <a:cs typeface="Tahoma"/>
             </a:endParaRPr>
           </a:p>
           <a:p>
             <a:pPr marL="12700">
-              <a:lnSpc>
-                <a:spcPct val="100000"/>
-              </a:lnSpc>
               <a:spcBef>
                 <a:spcPts val="140"/>
               </a:spcBef>
             </a:pPr>
             <a:r>
-              <a:rPr sz="1100" spc="-10" dirty="0">
-                <a:solidFill>
-                  <a:srgbClr val="444440"/>
-                </a:solidFill>
-                <a:latin typeface="Tahoma"/>
-                <a:cs typeface="Tahoma"/>
-              </a:rPr>
-              <a:t>Ingeniería </a:t>
-            </a:r>
-            <a:r>
-              <a:rPr sz="1100" spc="-20" dirty="0">
-                <a:solidFill>
-                  <a:srgbClr val="444440"/>
-                </a:solidFill>
-                <a:latin typeface="Tahoma"/>
-                <a:cs typeface="Tahoma"/>
-              </a:rPr>
-              <a:t>en</a:t>
-            </a:r>
-            <a:r>
-              <a:rPr sz="1100" spc="-10" dirty="0">
-                <a:solidFill>
-                  <a:srgbClr val="444440"/>
-                </a:solidFill>
-                <a:latin typeface="Tahoma"/>
-                <a:cs typeface="Tahoma"/>
-              </a:rPr>
-              <a:t> </a:t>
-            </a:r>
-            <a:r>
-              <a:rPr sz="1100" spc="-5" dirty="0">
-                <a:solidFill>
-                  <a:srgbClr val="444440"/>
-                </a:solidFill>
-                <a:latin typeface="Tahoma"/>
-                <a:cs typeface="Tahoma"/>
-              </a:rPr>
-              <a:t>Informática (plan</a:t>
-            </a:r>
-            <a:r>
-              <a:rPr sz="1100" spc="-10" dirty="0">
-                <a:solidFill>
-                  <a:srgbClr val="444440"/>
-                </a:solidFill>
-                <a:latin typeface="Tahoma"/>
-                <a:cs typeface="Tahoma"/>
-              </a:rPr>
-              <a:t> </a:t>
-            </a:r>
-            <a:r>
-              <a:rPr sz="1100" spc="5" dirty="0">
-                <a:solidFill>
-                  <a:srgbClr val="444440"/>
-                </a:solidFill>
-                <a:latin typeface="Tahoma"/>
-                <a:cs typeface="Tahoma"/>
-              </a:rPr>
-              <a:t>pre-Bolonia)</a:t>
-            </a:r>
-            <a:r>
-              <a:rPr sz="1100" spc="-5" dirty="0">
-                <a:solidFill>
-                  <a:srgbClr val="444440"/>
-                </a:solidFill>
-                <a:latin typeface="Tahoma"/>
-                <a:cs typeface="Tahoma"/>
-              </a:rPr>
-              <a:t> </a:t>
-            </a:r>
-            <a:r>
-              <a:rPr sz="1100" spc="-40" dirty="0">
-                <a:solidFill>
-                  <a:srgbClr val="444440"/>
-                </a:solidFill>
-                <a:latin typeface="Tahoma"/>
-                <a:cs typeface="Tahoma"/>
-              </a:rPr>
-              <a:t>2000-2005</a:t>
-            </a:r>
-            <a:endParaRPr sz="1100" dirty="0">
-              <a:latin typeface="Tahoma"/>
-              <a:cs typeface="Tahoma"/>
+              <a:rPr lang="es-ES" sz="1100" spc="-30" dirty="0" smtClean="0">
+                <a:solidFill>
+                  <a:srgbClr val="444440"/>
+                </a:solidFill>
+                <a:latin typeface="Trebuchet MS"/>
+                <a:cs typeface="Trebuchet MS"/>
+              </a:rPr>
+              <a:t>E.T.S</a:t>
+            </a:r>
+            <a:r>
+              <a:rPr lang="es-ES" sz="1100" spc="-30" dirty="0">
+                <a:solidFill>
+                  <a:srgbClr val="444440"/>
+                </a:solidFill>
+                <a:latin typeface="Trebuchet MS"/>
+                <a:cs typeface="Trebuchet MS"/>
+              </a:rPr>
+              <a:t>.</a:t>
+            </a:r>
+            <a:r>
+              <a:rPr lang="es-ES" sz="1100" spc="-10" dirty="0">
+                <a:solidFill>
+                  <a:srgbClr val="444440"/>
+                </a:solidFill>
+                <a:latin typeface="Trebuchet MS"/>
+                <a:cs typeface="Trebuchet MS"/>
+              </a:rPr>
+              <a:t> </a:t>
+            </a:r>
+            <a:r>
+              <a:rPr lang="es-ES" sz="1100" spc="5" dirty="0">
+                <a:solidFill>
+                  <a:srgbClr val="444440"/>
+                </a:solidFill>
+                <a:latin typeface="Trebuchet MS"/>
+                <a:cs typeface="Trebuchet MS"/>
+              </a:rPr>
+              <a:t>Ingeniería</a:t>
+            </a:r>
+            <a:r>
+              <a:rPr lang="es-ES" sz="1100" spc="-10" dirty="0">
+                <a:solidFill>
+                  <a:srgbClr val="444440"/>
+                </a:solidFill>
+                <a:latin typeface="Trebuchet MS"/>
+                <a:cs typeface="Trebuchet MS"/>
+              </a:rPr>
+              <a:t> </a:t>
+            </a:r>
+            <a:r>
+              <a:rPr lang="es-ES" sz="1100" spc="10" dirty="0">
+                <a:solidFill>
+                  <a:srgbClr val="444440"/>
+                </a:solidFill>
+                <a:latin typeface="Trebuchet MS"/>
+                <a:cs typeface="Trebuchet MS"/>
+              </a:rPr>
+              <a:t>Informática</a:t>
+            </a:r>
+            <a:r>
+              <a:rPr lang="es-ES" sz="1100" spc="-10" dirty="0">
+                <a:solidFill>
+                  <a:srgbClr val="444440"/>
+                </a:solidFill>
+                <a:latin typeface="Trebuchet MS"/>
+                <a:cs typeface="Trebuchet MS"/>
+              </a:rPr>
+              <a:t> </a:t>
+            </a:r>
+            <a:r>
+              <a:rPr lang="es-ES" sz="1100" spc="-30" dirty="0">
+                <a:solidFill>
+                  <a:srgbClr val="444440"/>
+                </a:solidFill>
+                <a:latin typeface="Trebuchet MS"/>
+                <a:cs typeface="Trebuchet MS"/>
+              </a:rPr>
+              <a:t>de</a:t>
+            </a:r>
+            <a:r>
+              <a:rPr lang="es-ES" sz="1100" spc="-10" dirty="0">
+                <a:solidFill>
+                  <a:srgbClr val="444440"/>
+                </a:solidFill>
+                <a:latin typeface="Trebuchet MS"/>
+                <a:cs typeface="Trebuchet MS"/>
+              </a:rPr>
+              <a:t> </a:t>
+            </a:r>
+            <a:r>
+              <a:rPr lang="es-ES" sz="1100" spc="-5" dirty="0">
+                <a:solidFill>
+                  <a:srgbClr val="444440"/>
+                </a:solidFill>
+                <a:latin typeface="Trebuchet MS"/>
+                <a:cs typeface="Trebuchet MS"/>
+              </a:rPr>
+              <a:t>la</a:t>
+            </a:r>
+            <a:r>
+              <a:rPr lang="es-ES" sz="1100" spc="-10" dirty="0">
+                <a:solidFill>
+                  <a:srgbClr val="444440"/>
+                </a:solidFill>
+                <a:latin typeface="Trebuchet MS"/>
+                <a:cs typeface="Trebuchet MS"/>
+              </a:rPr>
+              <a:t> </a:t>
+            </a:r>
+            <a:r>
+              <a:rPr lang="es-ES" sz="1100" spc="10" dirty="0">
+                <a:solidFill>
+                  <a:srgbClr val="444440"/>
+                </a:solidFill>
+                <a:latin typeface="Trebuchet MS"/>
+                <a:cs typeface="Trebuchet MS"/>
+              </a:rPr>
+              <a:t>Universidad</a:t>
+            </a:r>
+            <a:r>
+              <a:rPr lang="es-ES" sz="1100" spc="-5" dirty="0">
+                <a:solidFill>
+                  <a:srgbClr val="444440"/>
+                </a:solidFill>
+                <a:latin typeface="Trebuchet MS"/>
+                <a:cs typeface="Trebuchet MS"/>
+              </a:rPr>
+              <a:t> </a:t>
+            </a:r>
+            <a:r>
+              <a:rPr lang="es-ES" sz="1100" spc="-30" dirty="0">
+                <a:solidFill>
+                  <a:srgbClr val="444440"/>
+                </a:solidFill>
+                <a:latin typeface="Trebuchet MS"/>
+                <a:cs typeface="Trebuchet MS"/>
+              </a:rPr>
+              <a:t>de</a:t>
+            </a:r>
+            <a:r>
+              <a:rPr lang="es-ES" sz="1100" spc="-10" dirty="0">
+                <a:solidFill>
+                  <a:srgbClr val="444440"/>
+                </a:solidFill>
+                <a:latin typeface="Trebuchet MS"/>
+                <a:cs typeface="Trebuchet MS"/>
+              </a:rPr>
+              <a:t> </a:t>
+            </a:r>
+            <a:r>
+              <a:rPr lang="es-ES" sz="1100" spc="30" dirty="0">
+                <a:solidFill>
+                  <a:srgbClr val="444440"/>
+                </a:solidFill>
+                <a:latin typeface="Trebuchet MS"/>
+                <a:cs typeface="Trebuchet MS"/>
+              </a:rPr>
+              <a:t>Málaga</a:t>
+            </a:r>
+            <a:endParaRPr lang="es-ES" sz="1100" dirty="0">
+              <a:latin typeface="Trebuchet MS"/>
+              <a:cs typeface="Trebuchet MS"/>
             </a:endParaRPr>
           </a:p>
           <a:p>
@@ -3608,7 +3641,7 @@
               </a:spcBef>
             </a:pPr>
             <a:r>
-              <a:rPr sz="1100" spc="5" dirty="0">
+              <a:rPr sz="1100" spc="5" dirty="0" smtClean="0">
                 <a:solidFill>
                   <a:srgbClr val="444440"/>
                 </a:solidFill>
@@ -3618,7 +3651,7 @@
               <a:t>Mi</a:t>
             </a:r>
             <a:r>
-              <a:rPr sz="1100" spc="-15" dirty="0">
+              <a:rPr sz="1100" spc="-15" dirty="0" smtClean="0">
                 <a:solidFill>
                   <a:srgbClr val="444440"/>
                 </a:solidFill>
@@ -4478,7 +4511,7 @@
         </p:nvSpPr>
         <p:spPr>
           <a:xfrm>
-            <a:off x="490902" y="5658511"/>
+            <a:off x="490902" y="5883275"/>
             <a:ext cx="1765300" cy="140970"/>
           </a:xfrm>
           <a:prstGeom prst="rect">
@@ -4924,7 +4957,7 @@
         </p:nvSpPr>
         <p:spPr>
           <a:xfrm>
-            <a:off x="501650" y="5910822"/>
+            <a:off x="501650" y="6207746"/>
             <a:ext cx="1981200" cy="132729"/>
           </a:xfrm>
           <a:prstGeom prst="rect">
@@ -4983,7 +5016,7 @@
                 <a:latin typeface="Tahoma"/>
                 <a:cs typeface="Tahoma"/>
               </a:rPr>
-              <a:t> </a:t>
+              <a:t> con </a:t>
             </a:r>
             <a:r>
               <a:rPr lang="es-ES" sz="750" spc="35" dirty="0" smtClean="0">
@@ -4993,57 +5026,7 @@
                 <a:latin typeface="Tahoma"/>
                 <a:cs typeface="Tahoma"/>
               </a:rPr>
-              <a:t>con </a:t>
-            </a:r>
-            <a:r>
-              <a:rPr lang="es-ES" sz="750" spc="35" dirty="0" err="1" smtClean="0">
-                <a:solidFill>
-                  <a:srgbClr val="FFFFFF"/>
-                </a:solidFill>
-                <a:latin typeface="Tahoma"/>
-                <a:cs typeface="Tahoma"/>
-              </a:rPr>
-              <a:t>MySQL</a:t>
-            </a:r>
-            <a:r>
-              <a:rPr lang="es-ES" sz="750" spc="35" dirty="0" smtClean="0">
-                <a:solidFill>
-                  <a:srgbClr val="FFFFFF"/>
-                </a:solidFill>
-                <a:latin typeface="Tahoma"/>
-                <a:cs typeface="Tahoma"/>
-              </a:rPr>
-              <a:t> e </a:t>
-            </a:r>
-            <a:r>
-              <a:rPr lang="es-ES" sz="750" spc="35" dirty="0" err="1">
-                <a:solidFill>
-                  <a:srgbClr val="FFFFFF"/>
-                </a:solidFill>
-                <a:latin typeface="Tahoma"/>
-                <a:cs typeface="Tahoma"/>
-              </a:rPr>
-              <a:t>H</a:t>
-            </a:r>
-            <a:r>
-              <a:rPr lang="es-ES" sz="750" spc="35" dirty="0" err="1" smtClean="0">
-                <a:solidFill>
-                  <a:srgbClr val="FFFFFF"/>
-                </a:solidFill>
-                <a:latin typeface="Tahoma"/>
-                <a:cs typeface="Tahoma"/>
-              </a:rPr>
-              <a:t>ibernate</a:t>
-            </a:r>
-            <a:r>
-              <a:rPr lang="es-ES" sz="750" spc="35" dirty="0" smtClean="0">
-                <a:solidFill>
-                  <a:srgbClr val="FFFFFF"/>
-                </a:solidFill>
-                <a:latin typeface="Tahoma"/>
-                <a:cs typeface="Tahoma"/>
-              </a:rPr>
-              <a:t> </a:t>
+              <a:t>MySQL </a:t>
             </a:r>
             <a:endParaRPr sz="750" dirty="0">
               <a:latin typeface="Tahoma"/>
@@ -5060,7 +5043,7 @@
         </p:nvSpPr>
         <p:spPr>
           <a:xfrm>
-            <a:off x="501650" y="6570150"/>
+            <a:off x="501650" y="6826964"/>
             <a:ext cx="1905000" cy="123111"/>
           </a:xfrm>
           <a:prstGeom prst="rect">
@@ -5186,7 +5169,7 @@
         </p:nvSpPr>
         <p:spPr>
           <a:xfrm>
-            <a:off x="501650" y="6873875"/>
+            <a:off x="501650" y="7131764"/>
             <a:ext cx="1550372" cy="123111"/>
           </a:xfrm>
           <a:prstGeom prst="rect">
@@ -5302,7 +5285,7 @@
         </p:nvSpPr>
         <p:spPr>
           <a:xfrm>
-            <a:off x="501650" y="6229861"/>
+            <a:off x="501650" y="6499860"/>
             <a:ext cx="791845" cy="145415"/>
           </a:xfrm>
           <a:prstGeom prst="rect">
@@ -5368,8 +5351,8 @@
         </p:nvSpPr>
         <p:spPr>
           <a:xfrm>
-            <a:off x="501650" y="7538179"/>
-            <a:ext cx="154305" cy="145415"/>
+            <a:off x="512705" y="7799352"/>
+            <a:ext cx="685800" cy="132729"/>
           </a:xfrm>
           <a:prstGeom prst="rect">
             <a:avLst/>
@@ -5390,7 +5373,7 @@
               </a:spcBef>
             </a:pPr>
             <a:r>
-              <a:rPr sz="750" spc="15" dirty="0">
+              <a:rPr sz="750" spc="15" dirty="0" smtClean="0">
                 <a:solidFill>
                   <a:srgbClr val="FFFFFF"/>
                 </a:solidFill>
@@ -5400,7 +5383,7 @@
               <a:t>G</a:t>
             </a:r>
             <a:r>
-              <a:rPr sz="750" spc="50" dirty="0">
+              <a:rPr sz="750" spc="50" dirty="0" smtClean="0">
                 <a:solidFill>
                   <a:srgbClr val="FFFFFF"/>
                 </a:solidFill>
@@ -5410,7 +5393,7 @@
               <a:t>i</a:t>
             </a:r>
             <a:r>
-              <a:rPr sz="750" spc="5" dirty="0">
+              <a:rPr sz="750" spc="5" dirty="0" smtClean="0">
                 <a:solidFill>
                   <a:srgbClr val="FFFFFF"/>
                 </a:solidFill>
@@ -5418,6 +5401,16 @@
                 <a:cs typeface="Tahoma"/>
               </a:rPr>
               <a:t>t</a:t>
+            </a:r>
+            <a:r>
+              <a:rPr lang="es-ES" sz="750" spc="5" dirty="0" smtClean="0">
+                <a:solidFill>
+                  <a:srgbClr val="FFFFFF"/>
+                </a:solidFill>
+                <a:latin typeface="Tahoma"/>
+                <a:cs typeface="Tahoma"/>
+              </a:rPr>
+              <a:t> y Gihub</a:t>
             </a:r>
             <a:endParaRPr sz="750" dirty="0">
               <a:latin typeface="Tahoma"/>
@@ -5434,7 +5427,7 @@
         </p:nvSpPr>
         <p:spPr>
           <a:xfrm>
-            <a:off x="501650" y="7216958"/>
+            <a:off x="512705" y="7443456"/>
             <a:ext cx="1221740" cy="135890"/>
           </a:xfrm>
           <a:prstGeom prst="rect">
@@ -6806,84 +6799,84 @@
               <a:t> </a:t>
             </a:r>
             <a:r>
-              <a:rPr sz="1100" spc="25" dirty="0">
-                <a:solidFill>
-                  <a:srgbClr val="444440"/>
-                </a:solidFill>
-                <a:latin typeface="Tahoma"/>
-                <a:cs typeface="Tahoma"/>
-              </a:rPr>
-              <a:t>informática,</a:t>
-            </a:r>
-            <a:r>
-              <a:rPr sz="1100" spc="-15" dirty="0">
-                <a:solidFill>
-                  <a:srgbClr val="444440"/>
-                </a:solidFill>
-                <a:latin typeface="Tahoma"/>
-                <a:cs typeface="Tahoma"/>
-              </a:rPr>
-              <a:t> </a:t>
-            </a:r>
-            <a:r>
-              <a:rPr sz="1100" spc="20" dirty="0">
-                <a:solidFill>
-                  <a:srgbClr val="444440"/>
-                </a:solidFill>
-                <a:latin typeface="Tahoma"/>
-                <a:cs typeface="Tahoma"/>
-              </a:rPr>
-              <a:t>por</a:t>
-            </a:r>
-            <a:r>
-              <a:rPr sz="1100" spc="-10" dirty="0">
-                <a:solidFill>
-                  <a:srgbClr val="444440"/>
-                </a:solidFill>
-                <a:latin typeface="Tahoma"/>
-                <a:cs typeface="Tahoma"/>
-              </a:rPr>
-              <a:t> </a:t>
-            </a:r>
-            <a:r>
-              <a:rPr sz="1100" spc="25" dirty="0">
-                <a:solidFill>
-                  <a:srgbClr val="444440"/>
-                </a:solidFill>
-                <a:latin typeface="Tahoma"/>
-                <a:cs typeface="Tahoma"/>
-              </a:rPr>
-              <a:t>los</a:t>
-            </a:r>
-            <a:r>
-              <a:rPr sz="1100" spc="-10" dirty="0">
-                <a:solidFill>
-                  <a:srgbClr val="444440"/>
-                </a:solidFill>
-                <a:latin typeface="Tahoma"/>
-                <a:cs typeface="Tahoma"/>
-              </a:rPr>
-              <a:t> </a:t>
-            </a:r>
-            <a:r>
-              <a:rPr sz="1100" spc="20" dirty="0">
-                <a:solidFill>
-                  <a:srgbClr val="444440"/>
-                </a:solidFill>
-                <a:latin typeface="Tahoma"/>
-                <a:cs typeface="Tahoma"/>
-              </a:rPr>
-              <a:t>videojuegos</a:t>
-            </a:r>
-            <a:r>
-              <a:rPr sz="1100" spc="-10" dirty="0">
-                <a:solidFill>
-                  <a:srgbClr val="444440"/>
-                </a:solidFill>
-                <a:latin typeface="Tahoma"/>
-                <a:cs typeface="Tahoma"/>
-              </a:rPr>
-              <a:t> </a:t>
+              <a:rPr sz="1100" spc="25" dirty="0" smtClean="0">
+                <a:solidFill>
+                  <a:srgbClr val="444440"/>
+                </a:solidFill>
+                <a:latin typeface="Tahoma"/>
+                <a:cs typeface="Tahoma"/>
+              </a:rPr>
+              <a:t>informática</a:t>
+            </a:r>
+            <a:r>
+              <a:rPr sz="1100" spc="-45" dirty="0" smtClean="0">
+                <a:solidFill>
+                  <a:srgbClr val="444440"/>
+                </a:solidFill>
+                <a:latin typeface="Tahoma"/>
+                <a:cs typeface="Tahoma"/>
+              </a:rPr>
+              <a:t>y</a:t>
+            </a:r>
+            <a:r>
+              <a:rPr sz="1100" spc="-10" dirty="0" smtClean="0">
+                <a:solidFill>
+                  <a:srgbClr val="444440"/>
+                </a:solidFill>
+                <a:latin typeface="Tahoma"/>
+                <a:cs typeface="Tahoma"/>
+              </a:rPr>
+              <a:t> </a:t>
+            </a:r>
+            <a:r>
+              <a:rPr lang="es-ES" sz="1100" spc="-10" dirty="0" smtClean="0">
+                <a:solidFill>
+                  <a:srgbClr val="444440"/>
+                </a:solidFill>
+                <a:latin typeface="Tahoma"/>
+                <a:cs typeface="Tahoma"/>
+              </a:rPr>
+              <a:t>particular por el desarrollo de aplicaciones </a:t>
+            </a:r>
+            <a:r>
+              <a:rPr sz="1100" spc="-330" dirty="0" smtClean="0">
+                <a:solidFill>
+                  <a:srgbClr val="444440"/>
+                </a:solidFill>
+                <a:latin typeface="Tahoma"/>
+                <a:cs typeface="Tahoma"/>
+              </a:rPr>
+              <a:t> </a:t>
+            </a:r>
+            <a:r>
+              <a:rPr lang="es-ES" sz="1100" spc="20" dirty="0" smtClean="0">
+                <a:solidFill>
+                  <a:srgbClr val="444440"/>
+                </a:solidFill>
+                <a:latin typeface="Tahoma"/>
+                <a:cs typeface="Tahoma"/>
+              </a:rPr>
+              <a:t>expandiendo mis conocimientos con </a:t>
+            </a:r>
+            <a:r>
+              <a:rPr sz="1100" spc="15" dirty="0" smtClean="0">
+                <a:solidFill>
+                  <a:srgbClr val="444440"/>
+                </a:solidFill>
+                <a:latin typeface="Tahoma"/>
+                <a:cs typeface="Tahoma"/>
+              </a:rPr>
+              <a:t>nuevos </a:t>
+            </a:r>
+            <a:r>
+              <a:rPr sz="1100" spc="15" dirty="0">
+                <a:solidFill>
+                  <a:srgbClr val="444440"/>
+                </a:solidFill>
+                <a:latin typeface="Tahoma"/>
+                <a:cs typeface="Tahoma"/>
+              </a:rPr>
+              <a:t>lenguajes </a:t>
             </a:r>
             <a:r>
               <a:rPr sz="1100" spc="-45" dirty="0">
@@ -6893,66 +6886,6 @@
                 <a:latin typeface="Tahoma"/>
                 <a:cs typeface="Tahoma"/>
               </a:rPr>
-              <a:t>y</a:t>
-            </a:r>
-            <a:r>
-              <a:rPr sz="1100" spc="-10" dirty="0">
-                <a:solidFill>
-                  <a:srgbClr val="444440"/>
-                </a:solidFill>
-                <a:latin typeface="Tahoma"/>
-                <a:cs typeface="Tahoma"/>
-              </a:rPr>
-              <a:t> </a:t>
-            </a:r>
-            <a:r>
-              <a:rPr sz="1100" spc="20" dirty="0">
-                <a:solidFill>
-                  <a:srgbClr val="444440"/>
-                </a:solidFill>
-                <a:latin typeface="Tahoma"/>
-                <a:cs typeface="Tahoma"/>
-              </a:rPr>
-              <a:t>por </a:t>
-            </a:r>
-            <a:r>
-              <a:rPr sz="1100" spc="-330" dirty="0">
-                <a:solidFill>
-                  <a:srgbClr val="444440"/>
-                </a:solidFill>
-                <a:latin typeface="Tahoma"/>
-                <a:cs typeface="Tahoma"/>
-              </a:rPr>
-              <a:t> </a:t>
-            </a:r>
-            <a:r>
-              <a:rPr sz="1100" spc="20" dirty="0">
-                <a:solidFill>
-                  <a:srgbClr val="444440"/>
-                </a:solidFill>
-                <a:latin typeface="Tahoma"/>
-                <a:cs typeface="Tahoma"/>
-              </a:rPr>
-              <a:t>aprender </a:t>
-            </a:r>
-            <a:r>
-              <a:rPr sz="1100" spc="15" dirty="0">
-                <a:solidFill>
-                  <a:srgbClr val="444440"/>
-                </a:solidFill>
-                <a:latin typeface="Tahoma"/>
-                <a:cs typeface="Tahoma"/>
-              </a:rPr>
-              <a:t>nuevos lenguajes </a:t>
-            </a:r>
-            <a:r>
-              <a:rPr sz="1100" spc="-45" dirty="0">
-                <a:solidFill>
-                  <a:srgbClr val="444440"/>
-                </a:solidFill>
-                <a:latin typeface="Tahoma"/>
-                <a:cs typeface="Tahoma"/>
-              </a:rPr>
               <a:t>y </a:t>
             </a:r>
             <a:r>
@@ -6976,7 +6909,7 @@
               <a:t>de </a:t>
             </a:r>
             <a:r>
-              <a:rPr sz="1100" spc="30" dirty="0" err="1">
+              <a:rPr sz="1100" spc="30" dirty="0" smtClean="0">
                 <a:solidFill>
                   <a:srgbClr val="444440"/>
                 </a:solidFill>
@@ -6986,26 +6919,6 @@
               <a:t>desarrollo</a:t>
             </a:r>
             <a:r>
-              <a:rPr sz="1100" spc="30" dirty="0">
-                <a:solidFill>
-                  <a:srgbClr val="444440"/>
-                </a:solidFill>
-                <a:latin typeface="Tahoma"/>
-                <a:cs typeface="Tahoma"/>
-              </a:rPr>
-              <a:t> </a:t>
-            </a:r>
-            <a:r>
-              <a:rPr sz="1100" spc="35" dirty="0">
-                <a:solidFill>
-                  <a:srgbClr val="444440"/>
-                </a:solidFill>
-                <a:latin typeface="Tahoma"/>
-                <a:cs typeface="Tahoma"/>
-              </a:rPr>
-              <a:t> </a:t>
-            </a:r>
-            <a:r>
               <a:rPr lang="es-ES" sz="1100" spc="30" dirty="0" smtClean="0">
                 <a:solidFill>
                   <a:srgbClr val="444440"/>
@@ -7013,7 +6926,7 @@
                 <a:latin typeface="Tahoma"/>
                 <a:cs typeface="Tahoma"/>
               </a:rPr>
-              <a:t>cada </a:t>
+              <a:t> cada </a:t>
             </a:r>
             <a:r>
               <a:rPr sz="1100" spc="25" dirty="0" err="1" smtClean="0">
@@ -7092,7 +7005,7 @@
         </p:nvSpPr>
         <p:spPr>
           <a:xfrm>
-            <a:off x="3118081" y="8741888"/>
+            <a:off x="3118081" y="8550275"/>
             <a:ext cx="46990" cy="46990"/>
           </a:xfrm>
           <a:custGeom>
@@ -7157,7 +7070,7 @@
         </p:nvSpPr>
         <p:spPr>
           <a:xfrm>
-            <a:off x="3118081" y="8503285"/>
+            <a:off x="3118081" y="8397875"/>
             <a:ext cx="46990" cy="46990"/>
           </a:xfrm>
           <a:custGeom>
@@ -7287,8 +7200,8 @@
         </p:nvSpPr>
         <p:spPr>
           <a:xfrm>
-            <a:off x="3068291" y="8931275"/>
-            <a:ext cx="4225925" cy="887679"/>
+            <a:off x="3068291" y="8792772"/>
+            <a:ext cx="4225925" cy="900503"/>
           </a:xfrm>
           <a:prstGeom prst="rect">
             <a:avLst/>
@@ -7301,6 +7214,23 @@
           <a:lstStyle/>
           <a:p>
             <a:pPr marL="12700">
+              <a:spcBef>
+                <a:spcPts val="200"/>
+              </a:spcBef>
+            </a:pPr>
+            <a:r>
+              <a:rPr lang="es-ES" sz="1100" b="1" spc="-10" dirty="0">
+                <a:solidFill>
+                  <a:srgbClr val="444440"/>
+                </a:solidFill>
+                <a:latin typeface="Tahoma"/>
+                <a:cs typeface="Tahoma"/>
+              </a:rPr>
+              <a:t>Master en Profesorado ESO, FP Especialidad en Informática</a:t>
+            </a:r>
+          </a:p>
+          <a:p>
+            <a:pPr marL="12700">
               <a:lnSpc>
                 <a:spcPct val="100000"/>
               </a:lnSpc>
@@ -7309,127 +7239,137 @@
               </a:spcBef>
             </a:pPr>
             <a:r>
-              <a:rPr sz="1200" b="1" spc="-30" dirty="0">
+              <a:rPr sz="1200" spc="-30" dirty="0" smtClean="0">
                 <a:solidFill>
                   <a:srgbClr val="444440"/>
                 </a:solidFill>
                 <a:latin typeface="Trebuchet MS"/>
                 <a:cs typeface="Trebuchet MS"/>
               </a:rPr>
-              <a:t>E.T.S.</a:t>
-            </a:r>
-            <a:r>
-              <a:rPr sz="1200" b="1" spc="-10" dirty="0">
+              <a:t>E.T.S</a:t>
+            </a:r>
+            <a:r>
+              <a:rPr sz="1200" spc="-30" dirty="0">
                 <a:solidFill>
                   <a:srgbClr val="444440"/>
                 </a:solidFill>
                 <a:latin typeface="Trebuchet MS"/>
                 <a:cs typeface="Trebuchet MS"/>
               </a:rPr>
-              <a:t> </a:t>
-            </a:r>
-            <a:r>
-              <a:rPr sz="1200" b="1" spc="5" dirty="0">
+              <a:t>.</a:t>
+            </a:r>
+            <a:r>
+              <a:rPr sz="1200" spc="-10" dirty="0">
                 <a:solidFill>
                   <a:srgbClr val="444440"/>
                 </a:solidFill>
                 <a:latin typeface="Trebuchet MS"/>
                 <a:cs typeface="Trebuchet MS"/>
               </a:rPr>
-              <a:t>Ingeniería</a:t>
-            </a:r>
-            <a:r>
-              <a:rPr sz="1200" b="1" spc="-5" dirty="0">
+              <a:t> </a:t>
+            </a:r>
+            <a:r>
+              <a:rPr sz="1200" spc="5" dirty="0">
                 <a:solidFill>
                   <a:srgbClr val="444440"/>
                 </a:solidFill>
                 <a:latin typeface="Trebuchet MS"/>
                 <a:cs typeface="Trebuchet MS"/>
               </a:rPr>
-              <a:t> </a:t>
-            </a:r>
-            <a:r>
-              <a:rPr sz="1200" b="1" spc="10" dirty="0">
+              <a:t>Ingeniería</a:t>
+            </a:r>
+            <a:r>
+              <a:rPr sz="1200" spc="-5" dirty="0">
                 <a:solidFill>
                   <a:srgbClr val="444440"/>
                 </a:solidFill>
                 <a:latin typeface="Trebuchet MS"/>
                 <a:cs typeface="Trebuchet MS"/>
               </a:rPr>
-              <a:t>Informática</a:t>
-            </a:r>
-            <a:r>
-              <a:rPr sz="1200" b="1" spc="-5" dirty="0">
+              <a:t> </a:t>
+            </a:r>
+            <a:r>
+              <a:rPr sz="1200" spc="10" dirty="0">
                 <a:solidFill>
                   <a:srgbClr val="444440"/>
                 </a:solidFill>
                 <a:latin typeface="Trebuchet MS"/>
                 <a:cs typeface="Trebuchet MS"/>
               </a:rPr>
-              <a:t> </a:t>
-            </a:r>
-            <a:r>
-              <a:rPr sz="1200" b="1" spc="-30" dirty="0">
+              <a:t>Informática</a:t>
+            </a:r>
+            <a:r>
+              <a:rPr sz="1200" spc="-5" dirty="0">
                 <a:solidFill>
                   <a:srgbClr val="444440"/>
                 </a:solidFill>
                 <a:latin typeface="Trebuchet MS"/>
                 <a:cs typeface="Trebuchet MS"/>
               </a:rPr>
-              <a:t>de</a:t>
-            </a:r>
-            <a:r>
-              <a:rPr sz="1200" b="1" spc="-5" dirty="0">
+              <a:t> </a:t>
+            </a:r>
+            <a:r>
+              <a:rPr sz="1200" spc="-30" dirty="0">
                 <a:solidFill>
                   <a:srgbClr val="444440"/>
                 </a:solidFill>
                 <a:latin typeface="Trebuchet MS"/>
                 <a:cs typeface="Trebuchet MS"/>
               </a:rPr>
-              <a:t> la </a:t>
-            </a:r>
-            <a:r>
-              <a:rPr sz="1200" b="1" spc="10" dirty="0">
+              <a:t>de</a:t>
+            </a:r>
+            <a:r>
+              <a:rPr sz="1200" spc="-5" dirty="0">
                 <a:solidFill>
                   <a:srgbClr val="444440"/>
                 </a:solidFill>
                 <a:latin typeface="Trebuchet MS"/>
                 <a:cs typeface="Trebuchet MS"/>
               </a:rPr>
-              <a:t>Universidad</a:t>
-            </a:r>
-            <a:r>
-              <a:rPr sz="1200" b="1" spc="-5" dirty="0">
+              <a:t> la </a:t>
+            </a:r>
+            <a:r>
+              <a:rPr sz="1200" spc="10" dirty="0">
                 <a:solidFill>
                   <a:srgbClr val="444440"/>
                 </a:solidFill>
                 <a:latin typeface="Trebuchet MS"/>
                 <a:cs typeface="Trebuchet MS"/>
               </a:rPr>
-              <a:t> </a:t>
-            </a:r>
-            <a:r>
-              <a:rPr sz="1200" b="1" spc="-30" dirty="0">
+              <a:t>Universidad</a:t>
+            </a:r>
+            <a:r>
+              <a:rPr sz="1200" spc="-5" dirty="0">
                 <a:solidFill>
                   <a:srgbClr val="444440"/>
                 </a:solidFill>
                 <a:latin typeface="Trebuchet MS"/>
                 <a:cs typeface="Trebuchet MS"/>
               </a:rPr>
-              <a:t>de</a:t>
-            </a:r>
-            <a:r>
-              <a:rPr sz="1200" b="1" spc="-5" dirty="0">
+              <a:t> </a:t>
+            </a:r>
+            <a:r>
+              <a:rPr sz="1200" spc="-30" dirty="0">
                 <a:solidFill>
                   <a:srgbClr val="444440"/>
                 </a:solidFill>
                 <a:latin typeface="Trebuchet MS"/>
                 <a:cs typeface="Trebuchet MS"/>
               </a:rPr>
-              <a:t> </a:t>
-            </a:r>
-            <a:r>
-              <a:rPr sz="1200" b="1" spc="5" dirty="0">
+              <a:t>de</a:t>
+            </a:r>
+            <a:r>
+              <a:rPr sz="1200" spc="-5" dirty="0">
+                <a:solidFill>
+                  <a:srgbClr val="444440"/>
+                </a:solidFill>
+                <a:latin typeface="Trebuchet MS"/>
+                <a:cs typeface="Trebuchet MS"/>
+              </a:rPr>
+              <a:t> </a:t>
+            </a:r>
+            <a:r>
+              <a:rPr sz="1200" spc="5" dirty="0">
                 <a:solidFill>
                   <a:srgbClr val="444440"/>
                 </a:solidFill>
@@ -7442,96 +7382,6 @@
               <a:latin typeface="Trebuchet MS"/>
               <a:cs typeface="Trebuchet MS"/>
             </a:endParaRPr>
-          </a:p>
-          <a:p>
-            <a:pPr marL="12700">
-              <a:lnSpc>
-                <a:spcPct val="100000"/>
-              </a:lnSpc>
-              <a:spcBef>
-                <a:spcPts val="120"/>
-              </a:spcBef>
-            </a:pPr>
-            <a:r>
-              <a:rPr sz="1100" spc="-10" dirty="0">
-                <a:solidFill>
-                  <a:srgbClr val="444440"/>
-                </a:solidFill>
-                <a:latin typeface="Tahoma"/>
-                <a:cs typeface="Tahoma"/>
-              </a:rPr>
-              <a:t>Master </a:t>
-            </a:r>
-            <a:r>
-              <a:rPr lang="es-ES" sz="1100" spc="-10" dirty="0" smtClean="0">
-                <a:solidFill>
-                  <a:srgbClr val="444440"/>
-                </a:solidFill>
-                <a:latin typeface="Tahoma"/>
-                <a:cs typeface="Tahoma"/>
-              </a:rPr>
-              <a:t>en</a:t>
-            </a:r>
-            <a:r>
-              <a:rPr sz="1100" spc="-10" dirty="0" smtClean="0">
-                <a:solidFill>
-                  <a:srgbClr val="444440"/>
-                </a:solidFill>
-                <a:latin typeface="Tahoma"/>
-                <a:cs typeface="Tahoma"/>
-              </a:rPr>
-              <a:t> </a:t>
-            </a:r>
-            <a:r>
-              <a:rPr sz="1100" spc="-10" dirty="0" err="1">
-                <a:solidFill>
-                  <a:srgbClr val="444440"/>
-                </a:solidFill>
-                <a:latin typeface="Tahoma"/>
-                <a:cs typeface="Tahoma"/>
-              </a:rPr>
-              <a:t>Profesorado</a:t>
-            </a:r>
-            <a:r>
-              <a:rPr sz="1100" spc="-10" dirty="0">
-                <a:solidFill>
-                  <a:srgbClr val="444440"/>
-                </a:solidFill>
-                <a:latin typeface="Tahoma"/>
-                <a:cs typeface="Tahoma"/>
-              </a:rPr>
-              <a:t> </a:t>
-            </a:r>
-            <a:r>
-              <a:rPr lang="es-ES" sz="1100" spc="-10" dirty="0" smtClean="0">
-                <a:solidFill>
-                  <a:srgbClr val="444440"/>
-                </a:solidFill>
-                <a:latin typeface="Tahoma"/>
-                <a:cs typeface="Tahoma"/>
-              </a:rPr>
-              <a:t>ESO, FP Especialidad </a:t>
-            </a:r>
-            <a:r>
-              <a:rPr sz="1100" spc="-10" dirty="0" smtClean="0">
-                <a:solidFill>
-                  <a:srgbClr val="444440"/>
-                </a:solidFill>
-                <a:latin typeface="Tahoma"/>
-                <a:cs typeface="Tahoma"/>
-              </a:rPr>
-              <a:t>en </a:t>
-            </a:r>
-            <a:r>
-              <a:rPr sz="1100" spc="-10" dirty="0">
-                <a:solidFill>
-                  <a:srgbClr val="444440"/>
-                </a:solidFill>
-                <a:latin typeface="Tahoma"/>
-                <a:cs typeface="Tahoma"/>
-              </a:rPr>
-              <a:t>Informática</a:t>
-            </a:r>
           </a:p>
           <a:p>
             <a:pPr marL="182245" marR="297180">
@@ -7543,6 +7393,16 @@
               </a:spcBef>
             </a:pPr>
             <a:r>
+              <a:rPr sz="1100" spc="-10" dirty="0" smtClean="0">
+                <a:solidFill>
+                  <a:srgbClr val="444440"/>
+                </a:solidFill>
+                <a:latin typeface="Tahoma"/>
+                <a:cs typeface="Tahoma"/>
+              </a:rPr>
+              <a:t>Master </a:t>
+            </a:r>
+            <a:r>
               <a:rPr sz="1100" spc="-10" dirty="0">
                 <a:solidFill>
                   <a:srgbClr val="444440"/>
@@ -7550,7 +7410,7 @@
                 <a:latin typeface="Tahoma"/>
                 <a:cs typeface="Tahoma"/>
               </a:rPr>
-              <a:t>Master habilitante para la impartición en Ciclos Formativos de  Grado Superior</a:t>
+              <a:t>habilitante para la impartición en Ciclos Formativos de  Grado Superior</a:t>
             </a:r>
           </a:p>
         </p:txBody>
@@ -9018,7 +8878,7 @@
         </p:nvSpPr>
         <p:spPr>
           <a:xfrm>
-            <a:off x="501650" y="7857219"/>
+            <a:off x="501650" y="8112746"/>
             <a:ext cx="1221740" cy="132729"/>
           </a:xfrm>
           <a:prstGeom prst="rect">
@@ -9254,8 +9114,8 @@
         </p:nvSpPr>
         <p:spPr>
           <a:xfrm>
-            <a:off x="501650" y="8176260"/>
-            <a:ext cx="1550372" cy="132729"/>
+            <a:off x="501650" y="8417546"/>
+            <a:ext cx="2057400" cy="132729"/>
           </a:xfrm>
           <a:prstGeom prst="rect">
             <a:avLst/>
@@ -9326,7 +9186,7 @@
               <a:t> </a:t>
             </a:r>
             <a:r>
-              <a:rPr sz="750" spc="40" dirty="0">
+              <a:rPr sz="750" spc="40" dirty="0" smtClean="0">
                 <a:solidFill>
                   <a:srgbClr val="FFFFFF"/>
                 </a:solidFill>
@@ -9334,6 +9194,16 @@
                 <a:cs typeface="Tahoma"/>
               </a:rPr>
               <a:t>Kotlin</a:t>
+            </a:r>
+            <a:r>
+              <a:rPr lang="es-ES" sz="750" spc="40" dirty="0" smtClean="0">
+                <a:solidFill>
+                  <a:srgbClr val="FFFFFF"/>
+                </a:solidFill>
+                <a:latin typeface="Tahoma"/>
+                <a:cs typeface="Tahoma"/>
+              </a:rPr>
+              <a:t> y Firebase</a:t>
             </a:r>
             <a:endParaRPr sz="750" dirty="0">
               <a:latin typeface="Tahoma"/>
@@ -9480,7 +9350,7 @@
               </a:spcBef>
             </a:pPr>
             <a:r>
-              <a:rPr lang="es-ES" sz="750" spc="35" smtClean="0">
+              <a:rPr lang="es-ES" sz="750" spc="35" dirty="0" smtClean="0">
                 <a:solidFill>
                   <a:srgbClr val="FFFFFF"/>
                 </a:solidFill>
@@ -9517,6 +9387,94 @@
         <p:spPr>
           <a:xfrm>
             <a:off x="571760" y="4972282"/>
+            <a:ext cx="148993" cy="148993"/>
+          </a:xfrm>
+          <a:prstGeom prst="rect">
+            <a:avLst/>
+          </a:prstGeom>
+        </p:spPr>
+        <p:style>
+          <a:lnRef idx="2">
+            <a:schemeClr val="dk1"/>
+          </a:lnRef>
+          <a:fillRef idx="1">
+            <a:schemeClr val="lt1"/>
+          </a:fillRef>
+          <a:effectRef idx="0">
+            <a:schemeClr val="dk1"/>
+          </a:effectRef>
+          <a:fontRef idx="minor">
+            <a:schemeClr val="dk1"/>
+          </a:fontRef>
+        </p:style>
+      </p:pic>
+      <p:sp>
+        <p:nvSpPr>
+          <p:cNvPr id="34" name="object 3"/>
+          <p:cNvSpPr txBox="1"/>
+          <p:nvPr/>
+        </p:nvSpPr>
+        <p:spPr>
+          <a:xfrm>
+            <a:off x="806450" y="5368443"/>
+            <a:ext cx="1905000" cy="286232"/>
+          </a:xfrm>
+          <a:prstGeom prst="rect">
+            <a:avLst/>
+          </a:prstGeom>
+        </p:spPr>
+        <p:txBody>
+          <a:bodyPr vert="horz" wrap="square" lIns="0" tIns="11430" rIns="0" bIns="0" rtlCol="0">
+            <a:spAutoFit/>
+          </a:bodyPr>
+          <a:lstStyle/>
+          <a:p>
+            <a:pPr marL="12700" marR="5080">
+              <a:lnSpc>
+                <a:spcPct val="118600"/>
+              </a:lnSpc>
+              <a:spcBef>
+                <a:spcPts val="90"/>
+              </a:spcBef>
+            </a:pPr>
+            <a:r>
+              <a:rPr lang="es-ES" sz="750" spc="35" dirty="0">
+                <a:solidFill>
+                  <a:srgbClr val="FFFFFF"/>
+                </a:solidFill>
+                <a:latin typeface="Tahoma"/>
+                <a:cs typeface="Tahoma"/>
+              </a:rPr>
+              <a:t>https://www.youtube.com/watch?v=ZG3U0PKfxeg</a:t>
+            </a:r>
+            <a:endParaRPr sz="750" dirty="0">
+              <a:latin typeface="Tahoma"/>
+              <a:cs typeface="Tahoma"/>
+            </a:endParaRPr>
+          </a:p>
+        </p:txBody>
+      </p:sp>
+      <p:pic>
+        <p:nvPicPr>
+          <p:cNvPr id="36" name="object 24"/>
+          <p:cNvPicPr/>
+          <p:nvPr/>
+        </p:nvPicPr>
+        <p:blipFill>
+          <a:blip r:embed="rId7" cstate="print">
+            <a:extLst>
+              <a:ext uri="{28A0092B-C50C-407E-A947-70E740481C1C}">
+                <a14:useLocalDpi xmlns:a14="http://schemas.microsoft.com/office/drawing/2010/main" val="0"/>
+              </a:ext>
+            </a:extLst>
+          </a:blip>
+          <a:stretch>
+            <a:fillRect/>
+          </a:stretch>
+        </p:blipFill>
+        <p:spPr>
+          <a:xfrm>
+            <a:off x="581257" y="5353282"/>
             <a:ext cx="148993" cy="148993"/>
           </a:xfrm>
           <a:prstGeom prst="rect">

</xml_diff>